<commit_message>
Modify Web Site GUI Design.pptx
</commit_message>
<xml_diff>
--- a/Web Site GUI Design.pptx
+++ b/Web Site GUI Design.pptx
@@ -7,6 +7,7 @@
   <p:sldIdLst>
     <p:sldId id="256" r:id="rId2"/>
     <p:sldId id="257" r:id="rId3"/>
+    <p:sldId id="258" r:id="rId4"/>
   </p:sldIdLst>
   <p:sldSz cx="12192000" cy="6858000"/>
   <p:notesSz cx="6858000" cy="9144000"/>
@@ -3112,39 +3113,820 @@
       </p:grpSpPr>
       <p:sp>
         <p:nvSpPr>
-          <p:cNvPr id="2" name="제목 1"/>
-          <p:cNvSpPr>
-            <a:spLocks noGrp="1"/>
-          </p:cNvSpPr>
-          <p:nvPr>
-            <p:ph type="title"/>
-          </p:nvPr>
-        </p:nvSpPr>
-        <p:spPr/>
-        <p:txBody>
-          <a:bodyPr/>
-          <a:lstStyle/>
-          <a:p>
-            <a:endParaRPr lang="ko-KR" altLang="en-US"/>
-          </a:p>
-        </p:txBody>
-      </p:sp>
-      <p:sp>
-        <p:nvSpPr>
-          <p:cNvPr id="3" name="내용 개체 틀 2"/>
-          <p:cNvSpPr>
-            <a:spLocks noGrp="1"/>
-          </p:cNvSpPr>
-          <p:nvPr>
-            <p:ph idx="1"/>
-          </p:nvPr>
-        </p:nvSpPr>
-        <p:spPr/>
-        <p:txBody>
-          <a:bodyPr/>
-          <a:lstStyle/>
-          <a:p>
-            <a:endParaRPr lang="ko-KR" altLang="en-US"/>
+          <p:cNvPr id="4" name="직사각형 3"/>
+          <p:cNvSpPr/>
+          <p:nvPr/>
+        </p:nvSpPr>
+        <p:spPr>
+          <a:xfrm>
+            <a:off x="1136822" y="576648"/>
+            <a:ext cx="10297297" cy="5741773"/>
+          </a:xfrm>
+          <a:prstGeom prst="rect">
+            <a:avLst/>
+          </a:prstGeom>
+          <a:noFill/>
+        </p:spPr>
+        <p:style>
+          <a:lnRef idx="2">
+            <a:schemeClr val="accent1">
+              <a:shade val="50000"/>
+            </a:schemeClr>
+          </a:lnRef>
+          <a:fillRef idx="1">
+            <a:schemeClr val="accent1"/>
+          </a:fillRef>
+          <a:effectRef idx="0">
+            <a:schemeClr val="accent1"/>
+          </a:effectRef>
+          <a:fontRef idx="minor">
+            <a:schemeClr val="lt1"/>
+          </a:fontRef>
+        </p:style>
+        <p:txBody>
+          <a:bodyPr rtlCol="0" anchor="ctr"/>
+          <a:lstStyle/>
+          <a:p>
+            <a:pPr algn="ctr"/>
+            <a:endParaRPr lang="ko-KR" altLang="en-US"/>
+          </a:p>
+        </p:txBody>
+      </p:sp>
+      <p:sp>
+        <p:nvSpPr>
+          <p:cNvPr id="5" name="직사각형 4"/>
+          <p:cNvSpPr/>
+          <p:nvPr/>
+        </p:nvSpPr>
+        <p:spPr>
+          <a:xfrm>
+            <a:off x="1136822" y="576648"/>
+            <a:ext cx="10297297" cy="776291"/>
+          </a:xfrm>
+          <a:prstGeom prst="rect">
+            <a:avLst/>
+          </a:prstGeom>
+          <a:noFill/>
+        </p:spPr>
+        <p:style>
+          <a:lnRef idx="2">
+            <a:schemeClr val="accent1">
+              <a:shade val="50000"/>
+            </a:schemeClr>
+          </a:lnRef>
+          <a:fillRef idx="1">
+            <a:schemeClr val="accent1"/>
+          </a:fillRef>
+          <a:effectRef idx="0">
+            <a:schemeClr val="accent1"/>
+          </a:effectRef>
+          <a:fontRef idx="minor">
+            <a:schemeClr val="lt1"/>
+          </a:fontRef>
+        </p:style>
+        <p:txBody>
+          <a:bodyPr rtlCol="0" anchor="ctr"/>
+          <a:lstStyle/>
+          <a:p>
+            <a:pPr algn="ctr"/>
+            <a:endParaRPr lang="ko-KR" altLang="en-US"/>
+          </a:p>
+        </p:txBody>
+      </p:sp>
+      <p:sp>
+        <p:nvSpPr>
+          <p:cNvPr id="6" name="직사각형 5"/>
+          <p:cNvSpPr/>
+          <p:nvPr/>
+        </p:nvSpPr>
+        <p:spPr>
+          <a:xfrm>
+            <a:off x="1136822" y="1352939"/>
+            <a:ext cx="1419766" cy="4965482"/>
+          </a:xfrm>
+          <a:prstGeom prst="rect">
+            <a:avLst/>
+          </a:prstGeom>
+          <a:noFill/>
+        </p:spPr>
+        <p:style>
+          <a:lnRef idx="2">
+            <a:schemeClr val="accent1">
+              <a:shade val="50000"/>
+            </a:schemeClr>
+          </a:lnRef>
+          <a:fillRef idx="1">
+            <a:schemeClr val="accent1"/>
+          </a:fillRef>
+          <a:effectRef idx="0">
+            <a:schemeClr val="accent1"/>
+          </a:effectRef>
+          <a:fontRef idx="minor">
+            <a:schemeClr val="lt1"/>
+          </a:fontRef>
+        </p:style>
+        <p:txBody>
+          <a:bodyPr rtlCol="0" anchor="ctr"/>
+          <a:lstStyle/>
+          <a:p>
+            <a:pPr algn="ctr"/>
+            <a:endParaRPr lang="ko-KR" altLang="en-US"/>
+          </a:p>
+        </p:txBody>
+      </p:sp>
+      <p:sp>
+        <p:nvSpPr>
+          <p:cNvPr id="7" name="직사각형 6"/>
+          <p:cNvSpPr/>
+          <p:nvPr/>
+        </p:nvSpPr>
+        <p:spPr>
+          <a:xfrm>
+            <a:off x="1178810" y="1446241"/>
+            <a:ext cx="1060537" cy="363894"/>
+          </a:xfrm>
+          <a:prstGeom prst="rect">
+            <a:avLst/>
+          </a:prstGeom>
+          <a:noFill/>
+        </p:spPr>
+        <p:style>
+          <a:lnRef idx="2">
+            <a:schemeClr val="accent1">
+              <a:shade val="50000"/>
+            </a:schemeClr>
+          </a:lnRef>
+          <a:fillRef idx="1">
+            <a:schemeClr val="accent1"/>
+          </a:fillRef>
+          <a:effectRef idx="0">
+            <a:schemeClr val="accent1"/>
+          </a:effectRef>
+          <a:fontRef idx="minor">
+            <a:schemeClr val="lt1"/>
+          </a:fontRef>
+        </p:style>
+        <p:txBody>
+          <a:bodyPr rot="0" spcFirstLastPara="0" vertOverflow="overflow" horzOverflow="overflow" vert="horz" wrap="square" lIns="91440" tIns="45720" rIns="91440" bIns="45720" numCol="1" spcCol="0" rtlCol="0" fromWordArt="0" anchor="ctr" anchorCtr="0" forceAA="0" compatLnSpc="1">
+            <a:prstTxWarp prst="textNoShape">
+              <a:avLst/>
+            </a:prstTxWarp>
+            <a:noAutofit/>
+          </a:bodyPr>
+          <a:lstStyle/>
+          <a:p>
+            <a:pPr algn="ctr"/>
+            <a:r>
+              <a:rPr lang="ko-KR" altLang="en-US" sz="1600" smtClean="0">
+                <a:solidFill>
+                  <a:schemeClr val="tx1"/>
+                </a:solidFill>
+              </a:rPr>
+              <a:t>재생목록</a:t>
+            </a:r>
+            <a:endParaRPr lang="ko-KR" altLang="en-US" sz="1600">
+              <a:solidFill>
+                <a:schemeClr val="tx1"/>
+              </a:solidFill>
+            </a:endParaRPr>
+          </a:p>
+        </p:txBody>
+      </p:sp>
+      <p:sp>
+        <p:nvSpPr>
+          <p:cNvPr id="8" name="직사각형 7"/>
+          <p:cNvSpPr/>
+          <p:nvPr/>
+        </p:nvSpPr>
+        <p:spPr>
+          <a:xfrm>
+            <a:off x="1178810" y="2231863"/>
+            <a:ext cx="1335790" cy="363894"/>
+          </a:xfrm>
+          <a:prstGeom prst="rect">
+            <a:avLst/>
+          </a:prstGeom>
+          <a:noFill/>
+        </p:spPr>
+        <p:style>
+          <a:lnRef idx="2">
+            <a:schemeClr val="accent1">
+              <a:shade val="50000"/>
+            </a:schemeClr>
+          </a:lnRef>
+          <a:fillRef idx="1">
+            <a:schemeClr val="accent1"/>
+          </a:fillRef>
+          <a:effectRef idx="0">
+            <a:schemeClr val="accent1"/>
+          </a:effectRef>
+          <a:fontRef idx="minor">
+            <a:schemeClr val="lt1"/>
+          </a:fontRef>
+        </p:style>
+        <p:txBody>
+          <a:bodyPr rot="0" spcFirstLastPara="0" vertOverflow="overflow" horzOverflow="overflow" vert="horz" wrap="square" lIns="91440" tIns="45720" rIns="91440" bIns="45720" numCol="1" spcCol="0" rtlCol="0" fromWordArt="0" anchor="ctr" anchorCtr="0" forceAA="0" compatLnSpc="1">
+            <a:prstTxWarp prst="textNoShape">
+              <a:avLst/>
+            </a:prstTxWarp>
+            <a:noAutofit/>
+          </a:bodyPr>
+          <a:lstStyle/>
+          <a:p>
+            <a:pPr algn="ctr"/>
+            <a:r>
+              <a:rPr lang="ko-KR" altLang="en-US" dirty="0" smtClean="0">
+                <a:solidFill>
+                  <a:schemeClr val="tx1"/>
+                </a:solidFill>
+              </a:rPr>
+              <a:t>시청기록</a:t>
+            </a:r>
+            <a:endParaRPr lang="ko-KR" altLang="en-US" dirty="0">
+              <a:solidFill>
+                <a:schemeClr val="tx1"/>
+              </a:solidFill>
+            </a:endParaRPr>
+          </a:p>
+        </p:txBody>
+      </p:sp>
+      <p:sp>
+        <p:nvSpPr>
+          <p:cNvPr id="9" name="직사각형 8"/>
+          <p:cNvSpPr/>
+          <p:nvPr/>
+        </p:nvSpPr>
+        <p:spPr>
+          <a:xfrm>
+            <a:off x="1368532" y="806169"/>
+            <a:ext cx="1335790" cy="363894"/>
+          </a:xfrm>
+          <a:prstGeom prst="rect">
+            <a:avLst/>
+          </a:prstGeom>
+          <a:noFill/>
+        </p:spPr>
+        <p:style>
+          <a:lnRef idx="2">
+            <a:schemeClr val="accent1">
+              <a:shade val="50000"/>
+            </a:schemeClr>
+          </a:lnRef>
+          <a:fillRef idx="1">
+            <a:schemeClr val="accent1"/>
+          </a:fillRef>
+          <a:effectRef idx="0">
+            <a:schemeClr val="accent1"/>
+          </a:effectRef>
+          <a:fontRef idx="minor">
+            <a:schemeClr val="lt1"/>
+          </a:fontRef>
+        </p:style>
+        <p:txBody>
+          <a:bodyPr rot="0" spcFirstLastPara="0" vertOverflow="overflow" horzOverflow="overflow" vert="horz" wrap="square" lIns="91440" tIns="45720" rIns="91440" bIns="45720" numCol="1" spcCol="0" rtlCol="0" fromWordArt="0" anchor="ctr" anchorCtr="0" forceAA="0" compatLnSpc="1">
+            <a:prstTxWarp prst="textNoShape">
+              <a:avLst/>
+            </a:prstTxWarp>
+            <a:noAutofit/>
+          </a:bodyPr>
+          <a:lstStyle/>
+          <a:p>
+            <a:pPr algn="ctr"/>
+            <a:r>
+              <a:rPr lang="en-US" altLang="ko-KR" dirty="0" smtClean="0">
+                <a:solidFill>
+                  <a:schemeClr val="tx1"/>
+                </a:solidFill>
+              </a:rPr>
+              <a:t>YouTube</a:t>
+            </a:r>
+            <a:endParaRPr lang="ko-KR" altLang="en-US" dirty="0">
+              <a:solidFill>
+                <a:schemeClr val="tx1"/>
+              </a:solidFill>
+            </a:endParaRPr>
+          </a:p>
+        </p:txBody>
+      </p:sp>
+      <p:sp>
+        <p:nvSpPr>
+          <p:cNvPr id="10" name="직사각형 9"/>
+          <p:cNvSpPr/>
+          <p:nvPr/>
+        </p:nvSpPr>
+        <p:spPr>
+          <a:xfrm>
+            <a:off x="1178810" y="5907872"/>
+            <a:ext cx="1335790" cy="363894"/>
+          </a:xfrm>
+          <a:prstGeom prst="rect">
+            <a:avLst/>
+          </a:prstGeom>
+          <a:noFill/>
+        </p:spPr>
+        <p:style>
+          <a:lnRef idx="2">
+            <a:schemeClr val="accent1">
+              <a:shade val="50000"/>
+            </a:schemeClr>
+          </a:lnRef>
+          <a:fillRef idx="1">
+            <a:schemeClr val="accent1"/>
+          </a:fillRef>
+          <a:effectRef idx="0">
+            <a:schemeClr val="accent1"/>
+          </a:effectRef>
+          <a:fontRef idx="minor">
+            <a:schemeClr val="lt1"/>
+          </a:fontRef>
+        </p:style>
+        <p:txBody>
+          <a:bodyPr rot="0" spcFirstLastPara="0" vertOverflow="overflow" horzOverflow="overflow" vert="horz" wrap="square" lIns="91440" tIns="45720" rIns="91440" bIns="45720" numCol="1" spcCol="0" rtlCol="0" fromWordArt="0" anchor="ctr" anchorCtr="0" forceAA="0" compatLnSpc="1">
+            <a:prstTxWarp prst="textNoShape">
+              <a:avLst/>
+            </a:prstTxWarp>
+            <a:noAutofit/>
+          </a:bodyPr>
+          <a:lstStyle/>
+          <a:p>
+            <a:pPr algn="ctr"/>
+            <a:r>
+              <a:rPr lang="en-US" altLang="ko-KR" sz="1400" dirty="0" smtClean="0">
+                <a:solidFill>
+                  <a:schemeClr val="tx1"/>
+                </a:solidFill>
+              </a:rPr>
+              <a:t>Made by</a:t>
+            </a:r>
+            <a:endParaRPr lang="ko-KR" altLang="en-US" sz="1400" dirty="0">
+              <a:solidFill>
+                <a:schemeClr val="tx1"/>
+              </a:solidFill>
+            </a:endParaRPr>
+          </a:p>
+        </p:txBody>
+      </p:sp>
+      <p:sp>
+        <p:nvSpPr>
+          <p:cNvPr id="11" name="직사각형 10"/>
+          <p:cNvSpPr/>
+          <p:nvPr/>
+        </p:nvSpPr>
+        <p:spPr>
+          <a:xfrm>
+            <a:off x="2556588" y="1352939"/>
+            <a:ext cx="7100596" cy="4965482"/>
+          </a:xfrm>
+          <a:prstGeom prst="rect">
+            <a:avLst/>
+          </a:prstGeom>
+          <a:noFill/>
+        </p:spPr>
+        <p:style>
+          <a:lnRef idx="2">
+            <a:schemeClr val="accent1">
+              <a:shade val="50000"/>
+            </a:schemeClr>
+          </a:lnRef>
+          <a:fillRef idx="1">
+            <a:schemeClr val="accent1"/>
+          </a:fillRef>
+          <a:effectRef idx="0">
+            <a:schemeClr val="accent1"/>
+          </a:effectRef>
+          <a:fontRef idx="minor">
+            <a:schemeClr val="lt1"/>
+          </a:fontRef>
+        </p:style>
+        <p:txBody>
+          <a:bodyPr rot="0" spcFirstLastPara="0" vertOverflow="overflow" horzOverflow="overflow" vert="horz" wrap="square" lIns="91440" tIns="45720" rIns="91440" bIns="45720" numCol="1" spcCol="0" rtlCol="0" fromWordArt="0" anchor="ctr" anchorCtr="0" forceAA="0" compatLnSpc="1">
+            <a:prstTxWarp prst="textNoShape">
+              <a:avLst/>
+            </a:prstTxWarp>
+            <a:noAutofit/>
+          </a:bodyPr>
+          <a:lstStyle/>
+          <a:p>
+            <a:pPr algn="ctr"/>
+            <a:r>
+              <a:rPr lang="en-US" altLang="ko-KR" dirty="0" smtClean="0">
+                <a:solidFill>
+                  <a:schemeClr val="tx1"/>
+                </a:solidFill>
+              </a:rPr>
+              <a:t>Player</a:t>
+            </a:r>
+            <a:endParaRPr lang="ko-KR" altLang="en-US" dirty="0">
+              <a:solidFill>
+                <a:schemeClr val="tx1"/>
+              </a:solidFill>
+            </a:endParaRPr>
+          </a:p>
+        </p:txBody>
+      </p:sp>
+      <p:sp>
+        <p:nvSpPr>
+          <p:cNvPr id="12" name="직사각형 11"/>
+          <p:cNvSpPr/>
+          <p:nvPr/>
+        </p:nvSpPr>
+        <p:spPr>
+          <a:xfrm>
+            <a:off x="9937144" y="782846"/>
+            <a:ext cx="1335790" cy="363894"/>
+          </a:xfrm>
+          <a:prstGeom prst="rect">
+            <a:avLst/>
+          </a:prstGeom>
+          <a:noFill/>
+        </p:spPr>
+        <p:style>
+          <a:lnRef idx="2">
+            <a:schemeClr val="accent1">
+              <a:shade val="50000"/>
+            </a:schemeClr>
+          </a:lnRef>
+          <a:fillRef idx="1">
+            <a:schemeClr val="accent1"/>
+          </a:fillRef>
+          <a:effectRef idx="0">
+            <a:schemeClr val="accent1"/>
+          </a:effectRef>
+          <a:fontRef idx="minor">
+            <a:schemeClr val="lt1"/>
+          </a:fontRef>
+        </p:style>
+        <p:txBody>
+          <a:bodyPr rot="0" spcFirstLastPara="0" vertOverflow="overflow" horzOverflow="overflow" vert="horz" wrap="square" lIns="91440" tIns="45720" rIns="91440" bIns="45720" numCol="1" spcCol="0" rtlCol="0" fromWordArt="0" anchor="ctr" anchorCtr="0" forceAA="0" compatLnSpc="1">
+            <a:prstTxWarp prst="textNoShape">
+              <a:avLst/>
+            </a:prstTxWarp>
+            <a:noAutofit/>
+          </a:bodyPr>
+          <a:lstStyle/>
+          <a:p>
+            <a:pPr algn="ctr"/>
+            <a:r>
+              <a:rPr lang="en-US" altLang="ko-KR" dirty="0" smtClean="0">
+                <a:solidFill>
+                  <a:schemeClr val="tx1"/>
+                </a:solidFill>
+              </a:rPr>
+              <a:t>Log in</a:t>
+            </a:r>
+            <a:endParaRPr lang="ko-KR" altLang="en-US" dirty="0">
+              <a:solidFill>
+                <a:schemeClr val="tx1"/>
+              </a:solidFill>
+            </a:endParaRPr>
+          </a:p>
+        </p:txBody>
+      </p:sp>
+      <p:sp>
+        <p:nvSpPr>
+          <p:cNvPr id="13" name="직사각형 12"/>
+          <p:cNvSpPr/>
+          <p:nvPr/>
+        </p:nvSpPr>
+        <p:spPr>
+          <a:xfrm>
+            <a:off x="9657184" y="1352939"/>
+            <a:ext cx="1776935" cy="4965482"/>
+          </a:xfrm>
+          <a:prstGeom prst="rect">
+            <a:avLst/>
+          </a:prstGeom>
+          <a:noFill/>
+        </p:spPr>
+        <p:style>
+          <a:lnRef idx="2">
+            <a:schemeClr val="accent1">
+              <a:shade val="50000"/>
+            </a:schemeClr>
+          </a:lnRef>
+          <a:fillRef idx="1">
+            <a:schemeClr val="accent1"/>
+          </a:fillRef>
+          <a:effectRef idx="0">
+            <a:schemeClr val="accent1"/>
+          </a:effectRef>
+          <a:fontRef idx="minor">
+            <a:schemeClr val="lt1"/>
+          </a:fontRef>
+        </p:style>
+        <p:txBody>
+          <a:bodyPr rot="0" spcFirstLastPara="0" vertOverflow="overflow" horzOverflow="overflow" vert="horz" wrap="square" lIns="91440" tIns="45720" rIns="91440" bIns="45720" numCol="1" spcCol="0" rtlCol="0" fromWordArt="0" anchor="ctr" anchorCtr="0" forceAA="0" compatLnSpc="1">
+            <a:prstTxWarp prst="textNoShape">
+              <a:avLst/>
+            </a:prstTxWarp>
+            <a:noAutofit/>
+          </a:bodyPr>
+          <a:lstStyle/>
+          <a:p>
+            <a:pPr algn="ctr"/>
+            <a:r>
+              <a:rPr lang="en-US" altLang="ko-KR" dirty="0" smtClean="0">
+                <a:solidFill>
+                  <a:schemeClr val="tx1"/>
+                </a:solidFill>
+              </a:rPr>
+              <a:t>Play List</a:t>
+            </a:r>
+            <a:endParaRPr lang="ko-KR" altLang="en-US" dirty="0">
+              <a:solidFill>
+                <a:schemeClr val="tx1"/>
+              </a:solidFill>
+            </a:endParaRPr>
+          </a:p>
+        </p:txBody>
+      </p:sp>
+      <p:sp>
+        <p:nvSpPr>
+          <p:cNvPr id="14" name="직사각형 13"/>
+          <p:cNvSpPr/>
+          <p:nvPr/>
+        </p:nvSpPr>
+        <p:spPr>
+          <a:xfrm>
+            <a:off x="3670082" y="806169"/>
+            <a:ext cx="5296635" cy="363894"/>
+          </a:xfrm>
+          <a:prstGeom prst="rect">
+            <a:avLst/>
+          </a:prstGeom>
+          <a:noFill/>
+        </p:spPr>
+        <p:style>
+          <a:lnRef idx="2">
+            <a:schemeClr val="accent1">
+              <a:shade val="50000"/>
+            </a:schemeClr>
+          </a:lnRef>
+          <a:fillRef idx="1">
+            <a:schemeClr val="accent1"/>
+          </a:fillRef>
+          <a:effectRef idx="0">
+            <a:schemeClr val="accent1"/>
+          </a:effectRef>
+          <a:fontRef idx="minor">
+            <a:schemeClr val="lt1"/>
+          </a:fontRef>
+        </p:style>
+        <p:txBody>
+          <a:bodyPr rot="0" spcFirstLastPara="0" vertOverflow="overflow" horzOverflow="overflow" vert="horz" wrap="square" lIns="91440" tIns="45720" rIns="91440" bIns="45720" numCol="1" spcCol="0" rtlCol="0" fromWordArt="0" anchor="ctr" anchorCtr="0" forceAA="0" compatLnSpc="1">
+            <a:prstTxWarp prst="textNoShape">
+              <a:avLst/>
+            </a:prstTxWarp>
+            <a:noAutofit/>
+          </a:bodyPr>
+          <a:lstStyle/>
+          <a:p>
+            <a:pPr algn="ctr"/>
+            <a:r>
+              <a:rPr lang="en-US" altLang="ko-KR" dirty="0" smtClean="0">
+                <a:solidFill>
+                  <a:schemeClr val="tx1"/>
+                </a:solidFill>
+              </a:rPr>
+              <a:t>Search</a:t>
+            </a:r>
+            <a:endParaRPr lang="ko-KR" altLang="en-US" dirty="0">
+              <a:solidFill>
+                <a:schemeClr val="tx1"/>
+              </a:solidFill>
+            </a:endParaRPr>
+          </a:p>
+        </p:txBody>
+      </p:sp>
+      <p:sp>
+        <p:nvSpPr>
+          <p:cNvPr id="15" name="직사각형 14"/>
+          <p:cNvSpPr/>
+          <p:nvPr/>
+        </p:nvSpPr>
+        <p:spPr>
+          <a:xfrm>
+            <a:off x="1178810" y="5497323"/>
+            <a:ext cx="1335790" cy="363894"/>
+          </a:xfrm>
+          <a:prstGeom prst="rect">
+            <a:avLst/>
+          </a:prstGeom>
+          <a:noFill/>
+        </p:spPr>
+        <p:style>
+          <a:lnRef idx="2">
+            <a:schemeClr val="accent1">
+              <a:shade val="50000"/>
+            </a:schemeClr>
+          </a:lnRef>
+          <a:fillRef idx="1">
+            <a:schemeClr val="accent1"/>
+          </a:fillRef>
+          <a:effectRef idx="0">
+            <a:schemeClr val="accent1"/>
+          </a:effectRef>
+          <a:fontRef idx="minor">
+            <a:schemeClr val="lt1"/>
+          </a:fontRef>
+        </p:style>
+        <p:txBody>
+          <a:bodyPr rot="0" spcFirstLastPara="0" vertOverflow="overflow" horzOverflow="overflow" vert="horz" wrap="square" lIns="91440" tIns="45720" rIns="91440" bIns="45720" numCol="1" spcCol="0" rtlCol="0" fromWordArt="0" anchor="ctr" anchorCtr="0" forceAA="0" compatLnSpc="1">
+            <a:prstTxWarp prst="textNoShape">
+              <a:avLst/>
+            </a:prstTxWarp>
+            <a:noAutofit/>
+          </a:bodyPr>
+          <a:lstStyle/>
+          <a:p>
+            <a:pPr algn="ctr"/>
+            <a:r>
+              <a:rPr lang="en-US" altLang="ko-KR" sz="1200" dirty="0" smtClean="0">
+                <a:solidFill>
+                  <a:schemeClr val="tx1"/>
+                </a:solidFill>
+              </a:rPr>
+              <a:t>Manage Video</a:t>
+            </a:r>
+            <a:endParaRPr lang="ko-KR" altLang="en-US" sz="1200" dirty="0">
+              <a:solidFill>
+                <a:schemeClr val="tx1"/>
+              </a:solidFill>
+            </a:endParaRPr>
+          </a:p>
+        </p:txBody>
+      </p:sp>
+      <p:sp>
+        <p:nvSpPr>
+          <p:cNvPr id="17" name="직사각형 16"/>
+          <p:cNvSpPr/>
+          <p:nvPr/>
+        </p:nvSpPr>
+        <p:spPr>
+          <a:xfrm>
+            <a:off x="2253343" y="1446241"/>
+            <a:ext cx="261257" cy="363894"/>
+          </a:xfrm>
+          <a:prstGeom prst="rect">
+            <a:avLst/>
+          </a:prstGeom>
+          <a:noFill/>
+        </p:spPr>
+        <p:style>
+          <a:lnRef idx="2">
+            <a:schemeClr val="accent1">
+              <a:shade val="50000"/>
+            </a:schemeClr>
+          </a:lnRef>
+          <a:fillRef idx="1">
+            <a:schemeClr val="accent1"/>
+          </a:fillRef>
+          <a:effectRef idx="0">
+            <a:schemeClr val="accent1"/>
+          </a:effectRef>
+          <a:fontRef idx="minor">
+            <a:schemeClr val="lt1"/>
+          </a:fontRef>
+        </p:style>
+        <p:txBody>
+          <a:bodyPr rot="0" spcFirstLastPara="0" vertOverflow="overflow" horzOverflow="overflow" vert="horz" wrap="square" lIns="91440" tIns="45720" rIns="91440" bIns="45720" numCol="1" spcCol="0" rtlCol="0" fromWordArt="0" anchor="ctr" anchorCtr="0" forceAA="0" compatLnSpc="1">
+            <a:prstTxWarp prst="textNoShape">
+              <a:avLst/>
+            </a:prstTxWarp>
+            <a:noAutofit/>
+          </a:bodyPr>
+          <a:lstStyle/>
+          <a:p>
+            <a:pPr algn="ctr"/>
+            <a:r>
+              <a:rPr lang="en-US" altLang="ko-KR" dirty="0" smtClean="0">
+                <a:solidFill>
+                  <a:schemeClr val="tx1"/>
+                </a:solidFill>
+              </a:rPr>
+              <a:t>+</a:t>
+            </a:r>
+            <a:endParaRPr lang="ko-KR" altLang="en-US" dirty="0">
+              <a:solidFill>
+                <a:schemeClr val="tx1"/>
+              </a:solidFill>
+            </a:endParaRPr>
+          </a:p>
+        </p:txBody>
+      </p:sp>
+      <p:sp>
+        <p:nvSpPr>
+          <p:cNvPr id="19" name="직사각형 18"/>
+          <p:cNvSpPr/>
+          <p:nvPr/>
+        </p:nvSpPr>
+        <p:spPr>
+          <a:xfrm>
+            <a:off x="1181916" y="1841241"/>
+            <a:ext cx="1060537" cy="363894"/>
+          </a:xfrm>
+          <a:prstGeom prst="rect">
+            <a:avLst/>
+          </a:prstGeom>
+          <a:noFill/>
+        </p:spPr>
+        <p:style>
+          <a:lnRef idx="2">
+            <a:schemeClr val="accent1">
+              <a:shade val="50000"/>
+            </a:schemeClr>
+          </a:lnRef>
+          <a:fillRef idx="1">
+            <a:schemeClr val="accent1"/>
+          </a:fillRef>
+          <a:effectRef idx="0">
+            <a:schemeClr val="accent1"/>
+          </a:effectRef>
+          <a:fontRef idx="minor">
+            <a:schemeClr val="lt1"/>
+          </a:fontRef>
+        </p:style>
+        <p:txBody>
+          <a:bodyPr rot="0" spcFirstLastPara="0" vertOverflow="overflow" horzOverflow="overflow" vert="horz" wrap="square" lIns="91440" tIns="45720" rIns="91440" bIns="45720" numCol="1" spcCol="0" rtlCol="0" fromWordArt="0" anchor="ctr" anchorCtr="0" forceAA="0" compatLnSpc="1">
+            <a:prstTxWarp prst="textNoShape">
+              <a:avLst/>
+            </a:prstTxWarp>
+            <a:noAutofit/>
+          </a:bodyPr>
+          <a:lstStyle/>
+          <a:p>
+            <a:pPr algn="ctr"/>
+            <a:r>
+              <a:rPr lang="ko-KR" altLang="en-US" sz="1600" smtClean="0">
+                <a:solidFill>
+                  <a:schemeClr val="tx1"/>
+                </a:solidFill>
+              </a:rPr>
+              <a:t>재생목록</a:t>
+            </a:r>
+            <a:endParaRPr lang="ko-KR" altLang="en-US" sz="1600">
+              <a:solidFill>
+                <a:schemeClr val="tx1"/>
+              </a:solidFill>
+            </a:endParaRPr>
+          </a:p>
+        </p:txBody>
+      </p:sp>
+      <p:sp>
+        <p:nvSpPr>
+          <p:cNvPr id="20" name="직사각형 19"/>
+          <p:cNvSpPr/>
+          <p:nvPr/>
+        </p:nvSpPr>
+        <p:spPr>
+          <a:xfrm>
+            <a:off x="2256449" y="1841241"/>
+            <a:ext cx="261257" cy="363894"/>
+          </a:xfrm>
+          <a:prstGeom prst="rect">
+            <a:avLst/>
+          </a:prstGeom>
+          <a:noFill/>
+        </p:spPr>
+        <p:style>
+          <a:lnRef idx="2">
+            <a:schemeClr val="accent1">
+              <a:shade val="50000"/>
+            </a:schemeClr>
+          </a:lnRef>
+          <a:fillRef idx="1">
+            <a:schemeClr val="accent1"/>
+          </a:fillRef>
+          <a:effectRef idx="0">
+            <a:schemeClr val="accent1"/>
+          </a:effectRef>
+          <a:fontRef idx="minor">
+            <a:schemeClr val="lt1"/>
+          </a:fontRef>
+        </p:style>
+        <p:txBody>
+          <a:bodyPr rot="0" spcFirstLastPara="0" vertOverflow="overflow" horzOverflow="overflow" vert="horz" wrap="square" lIns="91440" tIns="45720" rIns="91440" bIns="45720" numCol="1" spcCol="0" rtlCol="0" fromWordArt="0" anchor="ctr" anchorCtr="0" forceAA="0" compatLnSpc="1">
+            <a:prstTxWarp prst="textNoShape">
+              <a:avLst/>
+            </a:prstTxWarp>
+            <a:noAutofit/>
+          </a:bodyPr>
+          <a:lstStyle/>
+          <a:p>
+            <a:pPr algn="ctr"/>
+            <a:r>
+              <a:rPr lang="en-US" altLang="ko-KR" dirty="0" smtClean="0">
+                <a:solidFill>
+                  <a:schemeClr val="tx1"/>
+                </a:solidFill>
+              </a:rPr>
+              <a:t>+</a:t>
+            </a:r>
+            <a:endParaRPr lang="ko-KR" altLang="en-US" dirty="0">
+              <a:solidFill>
+                <a:schemeClr val="tx1"/>
+              </a:solidFill>
+            </a:endParaRPr>
           </a:p>
         </p:txBody>
       </p:sp>
@@ -3152,6 +3934,674 @@
     <p:extLst>
       <p:ext uri="{BB962C8B-B14F-4D97-AF65-F5344CB8AC3E}">
         <p14:creationId xmlns:p14="http://schemas.microsoft.com/office/powerpoint/2010/main" val="650190042"/>
+      </p:ext>
+    </p:extLst>
+  </p:cSld>
+  <p:clrMapOvr>
+    <a:masterClrMapping/>
+  </p:clrMapOvr>
+</p:sld>
+</file>
+
+<file path=ppt/slides/slide3.xml><?xml version="1.0" encoding="utf-8"?>
+<p:sld xmlns:a="http://schemas.openxmlformats.org/drawingml/2006/main" xmlns:r="http://schemas.openxmlformats.org/officeDocument/2006/relationships" xmlns:p="http://schemas.openxmlformats.org/presentationml/2006/main">
+  <p:cSld>
+    <p:spTree>
+      <p:nvGrpSpPr>
+        <p:cNvPr id="1" name=""/>
+        <p:cNvGrpSpPr/>
+        <p:nvPr/>
+      </p:nvGrpSpPr>
+      <p:grpSpPr>
+        <a:xfrm>
+          <a:off x="0" y="0"/>
+          <a:ext cx="0" cy="0"/>
+          <a:chOff x="0" y="0"/>
+          <a:chExt cx="0" cy="0"/>
+        </a:xfrm>
+      </p:grpSpPr>
+      <p:sp>
+        <p:nvSpPr>
+          <p:cNvPr id="4" name="직사각형 3"/>
+          <p:cNvSpPr/>
+          <p:nvPr/>
+        </p:nvSpPr>
+        <p:spPr>
+          <a:xfrm>
+            <a:off x="1136822" y="576648"/>
+            <a:ext cx="10297297" cy="5741773"/>
+          </a:xfrm>
+          <a:prstGeom prst="rect">
+            <a:avLst/>
+          </a:prstGeom>
+          <a:noFill/>
+        </p:spPr>
+        <p:style>
+          <a:lnRef idx="2">
+            <a:schemeClr val="accent1">
+              <a:shade val="50000"/>
+            </a:schemeClr>
+          </a:lnRef>
+          <a:fillRef idx="1">
+            <a:schemeClr val="accent1"/>
+          </a:fillRef>
+          <a:effectRef idx="0">
+            <a:schemeClr val="accent1"/>
+          </a:effectRef>
+          <a:fontRef idx="minor">
+            <a:schemeClr val="lt1"/>
+          </a:fontRef>
+        </p:style>
+        <p:txBody>
+          <a:bodyPr rtlCol="0" anchor="ctr"/>
+          <a:lstStyle/>
+          <a:p>
+            <a:pPr algn="ctr"/>
+            <a:endParaRPr lang="ko-KR" altLang="en-US"/>
+          </a:p>
+        </p:txBody>
+      </p:sp>
+      <p:sp>
+        <p:nvSpPr>
+          <p:cNvPr id="5" name="직사각형 4"/>
+          <p:cNvSpPr/>
+          <p:nvPr/>
+        </p:nvSpPr>
+        <p:spPr>
+          <a:xfrm>
+            <a:off x="1136822" y="576648"/>
+            <a:ext cx="10297297" cy="776291"/>
+          </a:xfrm>
+          <a:prstGeom prst="rect">
+            <a:avLst/>
+          </a:prstGeom>
+          <a:noFill/>
+        </p:spPr>
+        <p:style>
+          <a:lnRef idx="2">
+            <a:schemeClr val="accent1">
+              <a:shade val="50000"/>
+            </a:schemeClr>
+          </a:lnRef>
+          <a:fillRef idx="1">
+            <a:schemeClr val="accent1"/>
+          </a:fillRef>
+          <a:effectRef idx="0">
+            <a:schemeClr val="accent1"/>
+          </a:effectRef>
+          <a:fontRef idx="minor">
+            <a:schemeClr val="lt1"/>
+          </a:fontRef>
+        </p:style>
+        <p:txBody>
+          <a:bodyPr rtlCol="0" anchor="ctr"/>
+          <a:lstStyle/>
+          <a:p>
+            <a:pPr algn="ctr"/>
+            <a:endParaRPr lang="ko-KR" altLang="en-US"/>
+          </a:p>
+        </p:txBody>
+      </p:sp>
+      <p:sp>
+        <p:nvSpPr>
+          <p:cNvPr id="8" name="직사각형 7"/>
+          <p:cNvSpPr/>
+          <p:nvPr/>
+        </p:nvSpPr>
+        <p:spPr>
+          <a:xfrm>
+            <a:off x="5162982" y="2819691"/>
+            <a:ext cx="2945320" cy="2218839"/>
+          </a:xfrm>
+          <a:prstGeom prst="rect">
+            <a:avLst/>
+          </a:prstGeom>
+          <a:noFill/>
+        </p:spPr>
+        <p:style>
+          <a:lnRef idx="2">
+            <a:schemeClr val="accent1">
+              <a:shade val="50000"/>
+            </a:schemeClr>
+          </a:lnRef>
+          <a:fillRef idx="1">
+            <a:schemeClr val="accent1"/>
+          </a:fillRef>
+          <a:effectRef idx="0">
+            <a:schemeClr val="accent1"/>
+          </a:effectRef>
+          <a:fontRef idx="minor">
+            <a:schemeClr val="lt1"/>
+          </a:fontRef>
+        </p:style>
+        <p:txBody>
+          <a:bodyPr rot="0" spcFirstLastPara="0" vertOverflow="overflow" horzOverflow="overflow" vert="horz" wrap="square" lIns="91440" tIns="45720" rIns="91440" bIns="45720" numCol="1" spcCol="0" rtlCol="0" fromWordArt="0" anchor="ctr" anchorCtr="0" forceAA="0" compatLnSpc="1">
+            <a:prstTxWarp prst="textNoShape">
+              <a:avLst/>
+            </a:prstTxWarp>
+            <a:noAutofit/>
+          </a:bodyPr>
+          <a:lstStyle/>
+          <a:p>
+            <a:pPr algn="ctr"/>
+            <a:endParaRPr lang="ko-KR" altLang="en-US" dirty="0">
+              <a:solidFill>
+                <a:schemeClr val="tx1"/>
+              </a:solidFill>
+            </a:endParaRPr>
+          </a:p>
+        </p:txBody>
+      </p:sp>
+      <p:sp>
+        <p:nvSpPr>
+          <p:cNvPr id="9" name="직사각형 8"/>
+          <p:cNvSpPr/>
+          <p:nvPr/>
+        </p:nvSpPr>
+        <p:spPr>
+          <a:xfrm>
+            <a:off x="1368532" y="806169"/>
+            <a:ext cx="1335790" cy="363894"/>
+          </a:xfrm>
+          <a:prstGeom prst="rect">
+            <a:avLst/>
+          </a:prstGeom>
+          <a:noFill/>
+        </p:spPr>
+        <p:style>
+          <a:lnRef idx="2">
+            <a:schemeClr val="accent1">
+              <a:shade val="50000"/>
+            </a:schemeClr>
+          </a:lnRef>
+          <a:fillRef idx="1">
+            <a:schemeClr val="accent1"/>
+          </a:fillRef>
+          <a:effectRef idx="0">
+            <a:schemeClr val="accent1"/>
+          </a:effectRef>
+          <a:fontRef idx="minor">
+            <a:schemeClr val="lt1"/>
+          </a:fontRef>
+        </p:style>
+        <p:txBody>
+          <a:bodyPr rot="0" spcFirstLastPara="0" vertOverflow="overflow" horzOverflow="overflow" vert="horz" wrap="square" lIns="91440" tIns="45720" rIns="91440" bIns="45720" numCol="1" spcCol="0" rtlCol="0" fromWordArt="0" anchor="ctr" anchorCtr="0" forceAA="0" compatLnSpc="1">
+            <a:prstTxWarp prst="textNoShape">
+              <a:avLst/>
+            </a:prstTxWarp>
+            <a:noAutofit/>
+          </a:bodyPr>
+          <a:lstStyle/>
+          <a:p>
+            <a:pPr algn="ctr"/>
+            <a:r>
+              <a:rPr lang="en-US" altLang="ko-KR" dirty="0" smtClean="0">
+                <a:solidFill>
+                  <a:schemeClr val="tx1"/>
+                </a:solidFill>
+              </a:rPr>
+              <a:t>YouTube</a:t>
+            </a:r>
+            <a:endParaRPr lang="ko-KR" altLang="en-US" dirty="0">
+              <a:solidFill>
+                <a:schemeClr val="tx1"/>
+              </a:solidFill>
+            </a:endParaRPr>
+          </a:p>
+        </p:txBody>
+      </p:sp>
+      <p:sp>
+        <p:nvSpPr>
+          <p:cNvPr id="11" name="직사각형 10"/>
+          <p:cNvSpPr/>
+          <p:nvPr/>
+        </p:nvSpPr>
+        <p:spPr>
+          <a:xfrm>
+            <a:off x="2556587" y="1352939"/>
+            <a:ext cx="8877531" cy="4965482"/>
+          </a:xfrm>
+          <a:prstGeom prst="rect">
+            <a:avLst/>
+          </a:prstGeom>
+          <a:noFill/>
+        </p:spPr>
+        <p:style>
+          <a:lnRef idx="2">
+            <a:schemeClr val="accent1">
+              <a:shade val="50000"/>
+            </a:schemeClr>
+          </a:lnRef>
+          <a:fillRef idx="1">
+            <a:schemeClr val="accent1"/>
+          </a:fillRef>
+          <a:effectRef idx="0">
+            <a:schemeClr val="accent1"/>
+          </a:effectRef>
+          <a:fontRef idx="minor">
+            <a:schemeClr val="lt1"/>
+          </a:fontRef>
+        </p:style>
+        <p:txBody>
+          <a:bodyPr rot="0" spcFirstLastPara="0" vertOverflow="overflow" horzOverflow="overflow" vert="horz" wrap="square" lIns="91440" tIns="45720" rIns="91440" bIns="45720" numCol="1" spcCol="0" rtlCol="0" fromWordArt="0" anchor="ctr" anchorCtr="0" forceAA="0" compatLnSpc="1">
+            <a:prstTxWarp prst="textNoShape">
+              <a:avLst/>
+            </a:prstTxWarp>
+            <a:noAutofit/>
+          </a:bodyPr>
+          <a:lstStyle/>
+          <a:p>
+            <a:pPr algn="ctr"/>
+            <a:endParaRPr lang="ko-KR" altLang="en-US" dirty="0">
+              <a:solidFill>
+                <a:schemeClr val="tx1"/>
+              </a:solidFill>
+            </a:endParaRPr>
+          </a:p>
+        </p:txBody>
+      </p:sp>
+      <p:sp>
+        <p:nvSpPr>
+          <p:cNvPr id="18" name="직사각형 17"/>
+          <p:cNvSpPr/>
+          <p:nvPr/>
+        </p:nvSpPr>
+        <p:spPr>
+          <a:xfrm>
+            <a:off x="5288947" y="3274753"/>
+            <a:ext cx="1335790" cy="363894"/>
+          </a:xfrm>
+          <a:prstGeom prst="rect">
+            <a:avLst/>
+          </a:prstGeom>
+          <a:noFill/>
+        </p:spPr>
+        <p:style>
+          <a:lnRef idx="2">
+            <a:schemeClr val="accent1">
+              <a:shade val="50000"/>
+            </a:schemeClr>
+          </a:lnRef>
+          <a:fillRef idx="1">
+            <a:schemeClr val="accent1"/>
+          </a:fillRef>
+          <a:effectRef idx="0">
+            <a:schemeClr val="accent1"/>
+          </a:effectRef>
+          <a:fontRef idx="minor">
+            <a:schemeClr val="lt1"/>
+          </a:fontRef>
+        </p:style>
+        <p:txBody>
+          <a:bodyPr rot="0" spcFirstLastPara="0" vertOverflow="overflow" horzOverflow="overflow" vert="horz" wrap="square" lIns="91440" tIns="45720" rIns="91440" bIns="45720" numCol="1" spcCol="0" rtlCol="0" fromWordArt="0" anchor="ctr" anchorCtr="0" forceAA="0" compatLnSpc="1">
+            <a:prstTxWarp prst="textNoShape">
+              <a:avLst/>
+            </a:prstTxWarp>
+            <a:noAutofit/>
+          </a:bodyPr>
+          <a:lstStyle/>
+          <a:p>
+            <a:pPr algn="ctr"/>
+            <a:r>
+              <a:rPr lang="en-US" altLang="ko-KR" sz="1400" dirty="0" smtClean="0">
+                <a:solidFill>
+                  <a:schemeClr val="tx1"/>
+                </a:solidFill>
+              </a:rPr>
+              <a:t>ID</a:t>
+            </a:r>
+            <a:endParaRPr lang="ko-KR" altLang="en-US" sz="1400" dirty="0">
+              <a:solidFill>
+                <a:schemeClr val="tx1"/>
+              </a:solidFill>
+            </a:endParaRPr>
+          </a:p>
+        </p:txBody>
+      </p:sp>
+      <p:sp>
+        <p:nvSpPr>
+          <p:cNvPr id="21" name="직사각형 20"/>
+          <p:cNvSpPr/>
+          <p:nvPr/>
+        </p:nvSpPr>
+        <p:spPr>
+          <a:xfrm>
+            <a:off x="5162980" y="2819421"/>
+            <a:ext cx="2945321" cy="363894"/>
+          </a:xfrm>
+          <a:prstGeom prst="rect">
+            <a:avLst/>
+          </a:prstGeom>
+          <a:noFill/>
+        </p:spPr>
+        <p:style>
+          <a:lnRef idx="2">
+            <a:schemeClr val="accent1">
+              <a:shade val="50000"/>
+            </a:schemeClr>
+          </a:lnRef>
+          <a:fillRef idx="1">
+            <a:schemeClr val="accent1"/>
+          </a:fillRef>
+          <a:effectRef idx="0">
+            <a:schemeClr val="accent1"/>
+          </a:effectRef>
+          <a:fontRef idx="minor">
+            <a:schemeClr val="lt1"/>
+          </a:fontRef>
+        </p:style>
+        <p:txBody>
+          <a:bodyPr rot="0" spcFirstLastPara="0" vertOverflow="overflow" horzOverflow="overflow" vert="horz" wrap="square" lIns="91440" tIns="45720" rIns="91440" bIns="45720" numCol="1" spcCol="0" rtlCol="0" fromWordArt="0" anchor="ctr" anchorCtr="0" forceAA="0" compatLnSpc="1">
+            <a:prstTxWarp prst="textNoShape">
+              <a:avLst/>
+            </a:prstTxWarp>
+            <a:noAutofit/>
+          </a:bodyPr>
+          <a:lstStyle/>
+          <a:p>
+            <a:pPr algn="ctr"/>
+            <a:r>
+              <a:rPr lang="en-US" altLang="ko-KR" sz="1200" dirty="0" smtClean="0">
+                <a:solidFill>
+                  <a:schemeClr val="tx1"/>
+                </a:solidFill>
+              </a:rPr>
+              <a:t>Log In</a:t>
+            </a:r>
+            <a:endParaRPr lang="ko-KR" altLang="en-US" sz="1200" dirty="0">
+              <a:solidFill>
+                <a:schemeClr val="tx1"/>
+              </a:solidFill>
+            </a:endParaRPr>
+          </a:p>
+        </p:txBody>
+      </p:sp>
+      <p:sp>
+        <p:nvSpPr>
+          <p:cNvPr id="22" name="직사각형 21"/>
+          <p:cNvSpPr/>
+          <p:nvPr/>
+        </p:nvSpPr>
+        <p:spPr>
+          <a:xfrm>
+            <a:off x="6652730" y="3271177"/>
+            <a:ext cx="1335790" cy="363894"/>
+          </a:xfrm>
+          <a:prstGeom prst="rect">
+            <a:avLst/>
+          </a:prstGeom>
+          <a:noFill/>
+        </p:spPr>
+        <p:style>
+          <a:lnRef idx="2">
+            <a:schemeClr val="accent1">
+              <a:shade val="50000"/>
+            </a:schemeClr>
+          </a:lnRef>
+          <a:fillRef idx="1">
+            <a:schemeClr val="accent1"/>
+          </a:fillRef>
+          <a:effectRef idx="0">
+            <a:schemeClr val="accent1"/>
+          </a:effectRef>
+          <a:fontRef idx="minor">
+            <a:schemeClr val="lt1"/>
+          </a:fontRef>
+        </p:style>
+        <p:txBody>
+          <a:bodyPr rot="0" spcFirstLastPara="0" vertOverflow="overflow" horzOverflow="overflow" vert="horz" wrap="square" lIns="91440" tIns="45720" rIns="91440" bIns="45720" numCol="1" spcCol="0" rtlCol="0" fromWordArt="0" anchor="ctr" anchorCtr="0" forceAA="0" compatLnSpc="1">
+            <a:prstTxWarp prst="textNoShape">
+              <a:avLst/>
+            </a:prstTxWarp>
+            <a:noAutofit/>
+          </a:bodyPr>
+          <a:lstStyle/>
+          <a:p>
+            <a:pPr algn="ctr"/>
+            <a:endParaRPr lang="ko-KR" altLang="en-US" sz="1400" dirty="0">
+              <a:solidFill>
+                <a:schemeClr val="tx1"/>
+              </a:solidFill>
+            </a:endParaRPr>
+          </a:p>
+        </p:txBody>
+      </p:sp>
+      <p:sp>
+        <p:nvSpPr>
+          <p:cNvPr id="23" name="직사각형 22"/>
+          <p:cNvSpPr/>
+          <p:nvPr/>
+        </p:nvSpPr>
+        <p:spPr>
+          <a:xfrm>
+            <a:off x="5282722" y="3725728"/>
+            <a:ext cx="1335790" cy="363894"/>
+          </a:xfrm>
+          <a:prstGeom prst="rect">
+            <a:avLst/>
+          </a:prstGeom>
+          <a:noFill/>
+        </p:spPr>
+        <p:style>
+          <a:lnRef idx="2">
+            <a:schemeClr val="accent1">
+              <a:shade val="50000"/>
+            </a:schemeClr>
+          </a:lnRef>
+          <a:fillRef idx="1">
+            <a:schemeClr val="accent1"/>
+          </a:fillRef>
+          <a:effectRef idx="0">
+            <a:schemeClr val="accent1"/>
+          </a:effectRef>
+          <a:fontRef idx="minor">
+            <a:schemeClr val="lt1"/>
+          </a:fontRef>
+        </p:style>
+        <p:txBody>
+          <a:bodyPr rot="0" spcFirstLastPara="0" vertOverflow="overflow" horzOverflow="overflow" vert="horz" wrap="square" lIns="91440" tIns="45720" rIns="91440" bIns="45720" numCol="1" spcCol="0" rtlCol="0" fromWordArt="0" anchor="ctr" anchorCtr="0" forceAA="0" compatLnSpc="1">
+            <a:prstTxWarp prst="textNoShape">
+              <a:avLst/>
+            </a:prstTxWarp>
+            <a:noAutofit/>
+          </a:bodyPr>
+          <a:lstStyle/>
+          <a:p>
+            <a:pPr algn="ctr"/>
+            <a:r>
+              <a:rPr lang="en-US" altLang="ko-KR" sz="1400" dirty="0" smtClean="0">
+                <a:solidFill>
+                  <a:schemeClr val="tx1"/>
+                </a:solidFill>
+              </a:rPr>
+              <a:t>Password</a:t>
+            </a:r>
+            <a:endParaRPr lang="ko-KR" altLang="en-US" sz="1400" dirty="0">
+              <a:solidFill>
+                <a:schemeClr val="tx1"/>
+              </a:solidFill>
+            </a:endParaRPr>
+          </a:p>
+        </p:txBody>
+      </p:sp>
+      <p:sp>
+        <p:nvSpPr>
+          <p:cNvPr id="24" name="직사각형 23"/>
+          <p:cNvSpPr/>
+          <p:nvPr/>
+        </p:nvSpPr>
+        <p:spPr>
+          <a:xfrm>
+            <a:off x="6646505" y="3722152"/>
+            <a:ext cx="1335790" cy="363894"/>
+          </a:xfrm>
+          <a:prstGeom prst="rect">
+            <a:avLst/>
+          </a:prstGeom>
+          <a:noFill/>
+        </p:spPr>
+        <p:style>
+          <a:lnRef idx="2">
+            <a:schemeClr val="accent1">
+              <a:shade val="50000"/>
+            </a:schemeClr>
+          </a:lnRef>
+          <a:fillRef idx="1">
+            <a:schemeClr val="accent1"/>
+          </a:fillRef>
+          <a:effectRef idx="0">
+            <a:schemeClr val="accent1"/>
+          </a:effectRef>
+          <a:fontRef idx="minor">
+            <a:schemeClr val="lt1"/>
+          </a:fontRef>
+        </p:style>
+        <p:txBody>
+          <a:bodyPr rot="0" spcFirstLastPara="0" vertOverflow="overflow" horzOverflow="overflow" vert="horz" wrap="square" lIns="91440" tIns="45720" rIns="91440" bIns="45720" numCol="1" spcCol="0" rtlCol="0" fromWordArt="0" anchor="ctr" anchorCtr="0" forceAA="0" compatLnSpc="1">
+            <a:prstTxWarp prst="textNoShape">
+              <a:avLst/>
+            </a:prstTxWarp>
+            <a:noAutofit/>
+          </a:bodyPr>
+          <a:lstStyle/>
+          <a:p>
+            <a:pPr algn="ctr"/>
+            <a:r>
+              <a:rPr lang="en-US" altLang="ko-KR" sz="1400" dirty="0" smtClean="0">
+                <a:solidFill>
+                  <a:schemeClr val="tx1"/>
+                </a:solidFill>
+              </a:rPr>
+              <a:t>****</a:t>
+            </a:r>
+            <a:endParaRPr lang="ko-KR" altLang="en-US" sz="1400" dirty="0">
+              <a:solidFill>
+                <a:schemeClr val="tx1"/>
+              </a:solidFill>
+            </a:endParaRPr>
+          </a:p>
+        </p:txBody>
+      </p:sp>
+      <p:sp>
+        <p:nvSpPr>
+          <p:cNvPr id="25" name="직사각형 24"/>
+          <p:cNvSpPr/>
+          <p:nvPr/>
+        </p:nvSpPr>
+        <p:spPr>
+          <a:xfrm>
+            <a:off x="6618512" y="4229415"/>
+            <a:ext cx="1335790" cy="363894"/>
+          </a:xfrm>
+          <a:prstGeom prst="rect">
+            <a:avLst/>
+          </a:prstGeom>
+          <a:noFill/>
+        </p:spPr>
+        <p:style>
+          <a:lnRef idx="2">
+            <a:schemeClr val="accent1">
+              <a:shade val="50000"/>
+            </a:schemeClr>
+          </a:lnRef>
+          <a:fillRef idx="1">
+            <a:schemeClr val="accent1"/>
+          </a:fillRef>
+          <a:effectRef idx="0">
+            <a:schemeClr val="accent1"/>
+          </a:effectRef>
+          <a:fontRef idx="minor">
+            <a:schemeClr val="lt1"/>
+          </a:fontRef>
+        </p:style>
+        <p:txBody>
+          <a:bodyPr rot="0" spcFirstLastPara="0" vertOverflow="overflow" horzOverflow="overflow" vert="horz" wrap="square" lIns="91440" tIns="45720" rIns="91440" bIns="45720" numCol="1" spcCol="0" rtlCol="0" fromWordArt="0" anchor="ctr" anchorCtr="0" forceAA="0" compatLnSpc="1">
+            <a:prstTxWarp prst="textNoShape">
+              <a:avLst/>
+            </a:prstTxWarp>
+            <a:noAutofit/>
+          </a:bodyPr>
+          <a:lstStyle/>
+          <a:p>
+            <a:pPr algn="ctr"/>
+            <a:r>
+              <a:rPr lang="en-US" altLang="ko-KR" sz="1400" dirty="0" smtClean="0">
+                <a:solidFill>
+                  <a:schemeClr val="tx1"/>
+                </a:solidFill>
+              </a:rPr>
+              <a:t>Log in</a:t>
+            </a:r>
+            <a:endParaRPr lang="ko-KR" altLang="en-US" sz="1400" dirty="0">
+              <a:solidFill>
+                <a:schemeClr val="tx1"/>
+              </a:solidFill>
+            </a:endParaRPr>
+          </a:p>
+        </p:txBody>
+      </p:sp>
+      <p:sp>
+        <p:nvSpPr>
+          <p:cNvPr id="26" name="직사각형 25"/>
+          <p:cNvSpPr/>
+          <p:nvPr/>
+        </p:nvSpPr>
+        <p:spPr>
+          <a:xfrm>
+            <a:off x="6646505" y="5152508"/>
+            <a:ext cx="1335790" cy="363894"/>
+          </a:xfrm>
+          <a:prstGeom prst="rect">
+            <a:avLst/>
+          </a:prstGeom>
+          <a:noFill/>
+        </p:spPr>
+        <p:style>
+          <a:lnRef idx="2">
+            <a:schemeClr val="accent1">
+              <a:shade val="50000"/>
+            </a:schemeClr>
+          </a:lnRef>
+          <a:fillRef idx="1">
+            <a:schemeClr val="accent1"/>
+          </a:fillRef>
+          <a:effectRef idx="0">
+            <a:schemeClr val="accent1"/>
+          </a:effectRef>
+          <a:fontRef idx="minor">
+            <a:schemeClr val="lt1"/>
+          </a:fontRef>
+        </p:style>
+        <p:txBody>
+          <a:bodyPr rot="0" spcFirstLastPara="0" vertOverflow="overflow" horzOverflow="overflow" vert="horz" wrap="square" lIns="91440" tIns="45720" rIns="91440" bIns="45720" numCol="1" spcCol="0" rtlCol="0" fromWordArt="0" anchor="ctr" anchorCtr="0" forceAA="0" compatLnSpc="1">
+            <a:prstTxWarp prst="textNoShape">
+              <a:avLst/>
+            </a:prstTxWarp>
+            <a:noAutofit/>
+          </a:bodyPr>
+          <a:lstStyle/>
+          <a:p>
+            <a:pPr algn="ctr"/>
+            <a:r>
+              <a:rPr lang="ko-KR" altLang="en-US" sz="1400" dirty="0" smtClean="0">
+                <a:solidFill>
+                  <a:schemeClr val="tx1"/>
+                </a:solidFill>
+              </a:rPr>
+              <a:t>회원가입</a:t>
+            </a:r>
+            <a:endParaRPr lang="ko-KR" altLang="en-US" sz="1400" dirty="0">
+              <a:solidFill>
+                <a:schemeClr val="tx1"/>
+              </a:solidFill>
+            </a:endParaRPr>
+          </a:p>
+        </p:txBody>
+      </p:sp>
+    </p:spTree>
+    <p:extLst>
+      <p:ext uri="{BB962C8B-B14F-4D97-AF65-F5344CB8AC3E}">
+        <p14:creationId xmlns:p14="http://schemas.microsoft.com/office/powerpoint/2010/main" val="802785519"/>
       </p:ext>
     </p:extLst>
   </p:cSld>
@@ -3412,7 +4862,44 @@
       </a:bgFillStyleLst>
     </a:fmtScheme>
   </a:themeElements>
-  <a:objectDefaults/>
+  <a:objectDefaults>
+    <a:spDef>
+      <a:spPr>
+        <a:noFill/>
+      </a:spPr>
+      <a:bodyPr rot="0" spcFirstLastPara="0" vertOverflow="overflow" horzOverflow="overflow" vert="horz" wrap="square" lIns="91440" tIns="45720" rIns="91440" bIns="45720" numCol="1" spcCol="0" rtlCol="0" fromWordArt="0" anchor="ctr" anchorCtr="0" forceAA="0" compatLnSpc="1">
+        <a:prstTxWarp prst="textNoShape">
+          <a:avLst/>
+        </a:prstTxWarp>
+        <a:noAutofit/>
+      </a:bodyPr>
+      <a:lstStyle>
+        <a:defPPr algn="ctr">
+          <a:defRPr dirty="0">
+            <a:solidFill>
+              <a:schemeClr val="tx1"/>
+            </a:solidFill>
+          </a:defRPr>
+        </a:defPPr>
+      </a:lstStyle>
+      <a:style>
+        <a:lnRef idx="2">
+          <a:schemeClr val="accent1">
+            <a:shade val="50000"/>
+          </a:schemeClr>
+        </a:lnRef>
+        <a:fillRef idx="1">
+          <a:schemeClr val="accent1"/>
+        </a:fillRef>
+        <a:effectRef idx="0">
+          <a:schemeClr val="accent1"/>
+        </a:effectRef>
+        <a:fontRef idx="minor">
+          <a:schemeClr val="lt1"/>
+        </a:fontRef>
+      </a:style>
+    </a:spDef>
+  </a:objectDefaults>
   <a:extraClrSchemeLst/>
   <a:extLst>
     <a:ext uri="{05A4C25C-085E-4340-85A3-A5531E510DB2}">

</xml_diff>